<commit_message>
added image komponenten.png generated from komponenten.pptx
</commit_message>
<xml_diff>
--- a/latex/images/komponenten.pptx
+++ b/latex/images/komponenten.pptx
@@ -3117,7 +3117,9 @@
           </a:solidFill>
           <a:ln>
             <a:solidFill>
-              <a:schemeClr val="tx1"/>
+              <a:schemeClr val="accent1">
+                <a:lumMod val="50000"/>
+              </a:schemeClr>
             </a:solidFill>
           </a:ln>
         </p:spPr>
@@ -3158,29 +3160,68 @@
           </a:p>
         </p:txBody>
       </p:sp>
-      <p:sp>
-        <p:nvSpPr>
-          <p:cNvPr id="5" name="Abgerundetes Rechteck 4"/>
+      <p:cxnSp>
+        <p:nvCxnSpPr>
+          <p:cNvPr id="8" name="Gerade Verbindung mit Pfeil 7"/>
+          <p:cNvCxnSpPr/>
+          <p:nvPr/>
+        </p:nvCxnSpPr>
+        <p:spPr>
+          <a:xfrm>
+            <a:off x="2132303" y="2420888"/>
+            <a:ext cx="2583713" cy="0"/>
+          </a:xfrm>
+          <a:prstGeom prst="straightConnector1">
+            <a:avLst/>
+          </a:prstGeom>
+          <a:ln w="25400">
+            <a:solidFill>
+              <a:schemeClr val="tx1"/>
+            </a:solidFill>
+            <a:tailEnd type="triangle" w="lg" len="lg"/>
+          </a:ln>
+        </p:spPr>
+        <p:style>
+          <a:lnRef idx="1">
+            <a:schemeClr val="accent1"/>
+          </a:lnRef>
+          <a:fillRef idx="0">
+            <a:schemeClr val="accent1"/>
+          </a:fillRef>
+          <a:effectRef idx="0">
+            <a:schemeClr val="accent1"/>
+          </a:effectRef>
+          <a:fontRef idx="minor">
+            <a:schemeClr val="tx1"/>
+          </a:fontRef>
+        </p:style>
+      </p:cxnSp>
+      <p:sp>
+        <p:nvSpPr>
+          <p:cNvPr id="6" name="Rechteck 5"/>
           <p:cNvSpPr/>
           <p:nvPr/>
         </p:nvSpPr>
         <p:spPr>
           <a:xfrm>
-            <a:off x="2555776" y="1916832"/>
-            <a:ext cx="1872208" cy="864096"/>
+            <a:off x="2555776" y="1914329"/>
+            <a:ext cx="1800200" cy="864096"/>
           </a:xfrm>
-          <a:prstGeom prst="roundRect">
+          <a:prstGeom prst="rect">
             <a:avLst/>
           </a:prstGeom>
           <a:solidFill>
-            <a:schemeClr val="accent1">
-              <a:lumMod val="40000"/>
-              <a:lumOff val="60000"/>
+            <a:schemeClr val="accent3">
+              <a:lumMod val="60000"/>
+              <a:lumOff val="40000"/>
+              <a:alpha val="60000"/>
             </a:schemeClr>
           </a:solidFill>
           <a:ln>
             <a:solidFill>
-              <a:schemeClr val="tx1"/>
+              <a:schemeClr val="accent3">
+                <a:lumMod val="50000"/>
+              </a:schemeClr>
             </a:solidFill>
           </a:ln>
         </p:spPr>
@@ -3213,6 +3254,14 @@
               </a:rPr>
               <a:t>Tree-Builder</a:t>
             </a:r>
+            <a:endParaRPr lang="de-DE" dirty="0" smtClean="0">
+              <a:solidFill>
+                <a:schemeClr val="tx1"/>
+              </a:solidFill>
+            </a:endParaRPr>
+          </a:p>
+          <a:p>
+            <a:pPr algn="ctr"/>
             <a:endParaRPr lang="de-DE" dirty="0">
               <a:solidFill>
                 <a:schemeClr val="tx1"/>
@@ -3221,6 +3270,367 @@
           </a:p>
         </p:txBody>
       </p:sp>
+      <p:sp>
+        <p:nvSpPr>
+          <p:cNvPr id="10" name="Rechteck 9"/>
+          <p:cNvSpPr/>
+          <p:nvPr/>
+        </p:nvSpPr>
+        <p:spPr>
+          <a:xfrm>
+            <a:off x="4716016" y="1916832"/>
+            <a:ext cx="1800200" cy="864096"/>
+          </a:xfrm>
+          <a:prstGeom prst="rect">
+            <a:avLst/>
+          </a:prstGeom>
+          <a:solidFill>
+            <a:schemeClr val="accent3">
+              <a:lumMod val="60000"/>
+              <a:lumOff val="40000"/>
+              <a:alpha val="50000"/>
+            </a:schemeClr>
+          </a:solidFill>
+          <a:ln>
+            <a:solidFill>
+              <a:schemeClr val="accent3">
+                <a:lumMod val="50000"/>
+              </a:schemeClr>
+            </a:solidFill>
+          </a:ln>
+        </p:spPr>
+        <p:style>
+          <a:lnRef idx="2">
+            <a:schemeClr val="accent1">
+              <a:shade val="50000"/>
+            </a:schemeClr>
+          </a:lnRef>
+          <a:fillRef idx="1">
+            <a:schemeClr val="accent1"/>
+          </a:fillRef>
+          <a:effectRef idx="0">
+            <a:schemeClr val="accent1"/>
+          </a:effectRef>
+          <a:fontRef idx="minor">
+            <a:schemeClr val="lt1"/>
+          </a:fontRef>
+        </p:style>
+        <p:txBody>
+          <a:bodyPr rtlCol="0" anchor="ctr"/>
+          <a:lstStyle/>
+          <a:p>
+            <a:pPr algn="ctr"/>
+            <a:r>
+              <a:rPr lang="de-DE" dirty="0" smtClean="0">
+                <a:solidFill>
+                  <a:schemeClr val="tx1"/>
+                </a:solidFill>
+              </a:rPr>
+              <a:t>Parse-</a:t>
+            </a:r>
+            <a:r>
+              <a:rPr lang="de-DE" dirty="0" err="1" smtClean="0">
+                <a:solidFill>
+                  <a:schemeClr val="tx1"/>
+                </a:solidFill>
+              </a:rPr>
+              <a:t>Tree</a:t>
+            </a:r>
+            <a:endParaRPr lang="de-DE" dirty="0" smtClean="0">
+              <a:solidFill>
+                <a:schemeClr val="tx1"/>
+              </a:solidFill>
+            </a:endParaRPr>
+          </a:p>
+        </p:txBody>
+      </p:sp>
+      <p:sp>
+        <p:nvSpPr>
+          <p:cNvPr id="12" name="Rechteck 11"/>
+          <p:cNvSpPr/>
+          <p:nvPr/>
+        </p:nvSpPr>
+        <p:spPr>
+          <a:xfrm>
+            <a:off x="7092280" y="1914328"/>
+            <a:ext cx="1800200" cy="864096"/>
+          </a:xfrm>
+          <a:prstGeom prst="rect">
+            <a:avLst/>
+          </a:prstGeom>
+          <a:solidFill>
+            <a:schemeClr val="accent6">
+              <a:lumMod val="60000"/>
+              <a:lumOff val="40000"/>
+              <a:alpha val="50000"/>
+            </a:schemeClr>
+          </a:solidFill>
+          <a:ln>
+            <a:solidFill>
+              <a:schemeClr val="accent6">
+                <a:lumMod val="50000"/>
+              </a:schemeClr>
+            </a:solidFill>
+          </a:ln>
+        </p:spPr>
+        <p:style>
+          <a:lnRef idx="2">
+            <a:schemeClr val="accent1">
+              <a:shade val="50000"/>
+            </a:schemeClr>
+          </a:lnRef>
+          <a:fillRef idx="1">
+            <a:schemeClr val="accent1"/>
+          </a:fillRef>
+          <a:effectRef idx="0">
+            <a:schemeClr val="accent1"/>
+          </a:effectRef>
+          <a:fontRef idx="minor">
+            <a:schemeClr val="lt1"/>
+          </a:fontRef>
+        </p:style>
+        <p:txBody>
+          <a:bodyPr rtlCol="0" anchor="ctr"/>
+          <a:lstStyle/>
+          <a:p>
+            <a:pPr algn="ctr"/>
+            <a:r>
+              <a:rPr lang="de-DE" dirty="0" smtClean="0">
+                <a:solidFill>
+                  <a:schemeClr val="tx1"/>
+                </a:solidFill>
+              </a:rPr>
+              <a:t>AST</a:t>
+            </a:r>
+          </a:p>
+        </p:txBody>
+      </p:sp>
+      <p:cxnSp>
+        <p:nvCxnSpPr>
+          <p:cNvPr id="14" name="Gerade Verbindung mit Pfeil 13"/>
+          <p:cNvCxnSpPr>
+            <a:stCxn id="10" idx="3"/>
+            <a:endCxn id="12" idx="1"/>
+          </p:cNvCxnSpPr>
+          <p:nvPr/>
+        </p:nvCxnSpPr>
+        <p:spPr>
+          <a:xfrm flipV="1">
+            <a:off x="6516216" y="2346376"/>
+            <a:ext cx="576064" cy="2504"/>
+          </a:xfrm>
+          <a:prstGeom prst="straightConnector1">
+            <a:avLst/>
+          </a:prstGeom>
+          <a:ln w="25400">
+            <a:solidFill>
+              <a:schemeClr val="tx1"/>
+            </a:solidFill>
+            <a:prstDash val="dash"/>
+            <a:tailEnd type="triangle" w="lg" len="lg"/>
+          </a:ln>
+        </p:spPr>
+        <p:style>
+          <a:lnRef idx="1">
+            <a:schemeClr val="accent1"/>
+          </a:lnRef>
+          <a:fillRef idx="0">
+            <a:schemeClr val="accent1"/>
+          </a:fillRef>
+          <a:effectRef idx="0">
+            <a:schemeClr val="accent1"/>
+          </a:effectRef>
+          <a:fontRef idx="minor">
+            <a:schemeClr val="tx1"/>
+          </a:fontRef>
+        </p:style>
+      </p:cxnSp>
+      <p:sp>
+        <p:nvSpPr>
+          <p:cNvPr id="16" name="Abgerundetes Rechteck 15"/>
+          <p:cNvSpPr/>
+          <p:nvPr/>
+        </p:nvSpPr>
+        <p:spPr>
+          <a:xfrm>
+            <a:off x="5904148" y="4437112"/>
+            <a:ext cx="1800200" cy="864096"/>
+          </a:xfrm>
+          <a:prstGeom prst="roundRect">
+            <a:avLst/>
+          </a:prstGeom>
+          <a:solidFill>
+            <a:schemeClr val="accent1">
+              <a:lumMod val="40000"/>
+              <a:lumOff val="60000"/>
+            </a:schemeClr>
+          </a:solidFill>
+          <a:ln>
+            <a:solidFill>
+              <a:schemeClr val="accent1">
+                <a:lumMod val="50000"/>
+              </a:schemeClr>
+            </a:solidFill>
+          </a:ln>
+        </p:spPr>
+        <p:style>
+          <a:lnRef idx="2">
+            <a:schemeClr val="accent1">
+              <a:shade val="50000"/>
+            </a:schemeClr>
+          </a:lnRef>
+          <a:fillRef idx="1">
+            <a:schemeClr val="accent1"/>
+          </a:fillRef>
+          <a:effectRef idx="0">
+            <a:schemeClr val="accent1"/>
+          </a:effectRef>
+          <a:fontRef idx="minor">
+            <a:schemeClr val="lt1"/>
+          </a:fontRef>
+        </p:style>
+        <p:txBody>
+          <a:bodyPr rtlCol="0" anchor="ctr"/>
+          <a:lstStyle/>
+          <a:p>
+            <a:pPr algn="ctr"/>
+            <a:r>
+              <a:rPr lang="de-DE" dirty="0" err="1" smtClean="0">
+                <a:solidFill>
+                  <a:schemeClr val="tx1"/>
+                </a:solidFill>
+              </a:rPr>
+              <a:t>Ausfühbarer</a:t>
+            </a:r>
+            <a:r>
+              <a:rPr lang="de-DE" dirty="0" smtClean="0">
+                <a:solidFill>
+                  <a:schemeClr val="tx1"/>
+                </a:solidFill>
+              </a:rPr>
+              <a:t> Code (Ausgabe)</a:t>
+            </a:r>
+            <a:endParaRPr lang="de-DE" dirty="0">
+              <a:solidFill>
+                <a:schemeClr val="tx1"/>
+              </a:solidFill>
+            </a:endParaRPr>
+          </a:p>
+        </p:txBody>
+      </p:sp>
+      <p:cxnSp>
+        <p:nvCxnSpPr>
+          <p:cNvPr id="17" name="Gerade Verbindung mit Pfeil 16"/>
+          <p:cNvCxnSpPr>
+            <a:stCxn id="10" idx="2"/>
+            <a:endCxn id="16" idx="0"/>
+          </p:cNvCxnSpPr>
+          <p:nvPr/>
+        </p:nvCxnSpPr>
+        <p:spPr>
+          <a:xfrm rot="16200000" flipH="1">
+            <a:off x="5382090" y="3014954"/>
+            <a:ext cx="1656184" cy="1188132"/>
+          </a:xfrm>
+          <a:prstGeom prst="curvedConnector3">
+            <a:avLst>
+              <a:gd name="adj1" fmla="val 50000"/>
+            </a:avLst>
+          </a:prstGeom>
+          <a:ln w="25400">
+            <a:solidFill>
+              <a:schemeClr val="tx1"/>
+            </a:solidFill>
+            <a:prstDash val="solid"/>
+            <a:tailEnd type="triangle" w="lg" len="lg"/>
+          </a:ln>
+        </p:spPr>
+        <p:style>
+          <a:lnRef idx="1">
+            <a:schemeClr val="accent1"/>
+          </a:lnRef>
+          <a:fillRef idx="0">
+            <a:schemeClr val="accent1"/>
+          </a:fillRef>
+          <a:effectRef idx="0">
+            <a:schemeClr val="accent1"/>
+          </a:effectRef>
+          <a:fontRef idx="minor">
+            <a:schemeClr val="tx1"/>
+          </a:fontRef>
+        </p:style>
+      </p:cxnSp>
+      <p:sp>
+        <p:nvSpPr>
+          <p:cNvPr id="20" name="Textfeld 19"/>
+          <p:cNvSpPr txBox="1"/>
+          <p:nvPr/>
+        </p:nvSpPr>
+        <p:spPr>
+          <a:xfrm>
+            <a:off x="3356731" y="3183347"/>
+            <a:ext cx="1215269" cy="369332"/>
+          </a:xfrm>
+          <a:prstGeom prst="rect">
+            <a:avLst/>
+          </a:prstGeom>
+          <a:noFill/>
+        </p:spPr>
+        <p:txBody>
+          <a:bodyPr wrap="none" rtlCol="0">
+            <a:spAutoFit/>
+          </a:bodyPr>
+          <a:lstStyle/>
+          <a:p>
+            <a:r>
+              <a:rPr lang="de-DE" dirty="0" smtClean="0"/>
+              <a:t>Interpreter</a:t>
+            </a:r>
+            <a:endParaRPr lang="de-DE" dirty="0"/>
+          </a:p>
+        </p:txBody>
+      </p:sp>
+      <p:cxnSp>
+        <p:nvCxnSpPr>
+          <p:cNvPr id="37" name="Gekrümmte Verbindung 36"/>
+          <p:cNvCxnSpPr>
+            <a:stCxn id="12" idx="2"/>
+            <a:endCxn id="16" idx="0"/>
+          </p:cNvCxnSpPr>
+          <p:nvPr/>
+        </p:nvCxnSpPr>
+        <p:spPr>
+          <a:xfrm rot="5400000">
+            <a:off x="6568970" y="3013702"/>
+            <a:ext cx="1658688" cy="1188132"/>
+          </a:xfrm>
+          <a:prstGeom prst="curvedConnector3">
+            <a:avLst>
+              <a:gd name="adj1" fmla="val 50000"/>
+            </a:avLst>
+          </a:prstGeom>
+          <a:ln w="25400">
+            <a:solidFill>
+              <a:schemeClr val="tx1"/>
+            </a:solidFill>
+            <a:tailEnd type="triangle" w="lg" len="lg"/>
+          </a:ln>
+        </p:spPr>
+        <p:style>
+          <a:lnRef idx="1">
+            <a:schemeClr val="accent1"/>
+          </a:lnRef>
+          <a:fillRef idx="0">
+            <a:schemeClr val="accent1"/>
+          </a:fillRef>
+          <a:effectRef idx="0">
+            <a:schemeClr val="accent1"/>
+          </a:effectRef>
+          <a:fontRef idx="minor">
+            <a:schemeClr val="tx1"/>
+          </a:fontRef>
+        </p:style>
+      </p:cxnSp>
     </p:spTree>
     <p:extLst>
       <p:ext uri="{BB962C8B-B14F-4D97-AF65-F5344CB8AC3E}">

</xml_diff>